<commit_message>
Changes to prezzie slides
</commit_message>
<xml_diff>
--- a/WURI OP2.pptx
+++ b/WURI OP2.pptx
@@ -5,33 +5,34 @@
     <p:sldMasterId id="2147483894" r:id="rId1"/>
   </p:sldMasterIdLst>
   <p:notesMasterIdLst>
-    <p:notesMasterId r:id="rId11"/>
+    <p:notesMasterId r:id="rId12"/>
   </p:notesMasterIdLst>
   <p:sldIdLst>
     <p:sldId id="256" r:id="rId2"/>
-    <p:sldId id="259" r:id="rId3"/>
-    <p:sldId id="260" r:id="rId4"/>
-    <p:sldId id="265" r:id="rId5"/>
-    <p:sldId id="261" r:id="rId6"/>
-    <p:sldId id="262" r:id="rId7"/>
-    <p:sldId id="263" r:id="rId8"/>
-    <p:sldId id="266" r:id="rId9"/>
-    <p:sldId id="264" r:id="rId10"/>
+    <p:sldId id="267" r:id="rId3"/>
+    <p:sldId id="259" r:id="rId4"/>
+    <p:sldId id="260" r:id="rId5"/>
+    <p:sldId id="265" r:id="rId6"/>
+    <p:sldId id="261" r:id="rId7"/>
+    <p:sldId id="262" r:id="rId8"/>
+    <p:sldId id="263" r:id="rId9"/>
+    <p:sldId id="266" r:id="rId10"/>
+    <p:sldId id="264" r:id="rId11"/>
   </p:sldIdLst>
   <p:sldSz cx="9144000" cy="5143500" type="screen16x9"/>
   <p:notesSz cx="6858000" cy="9144000"/>
   <p:embeddedFontLst>
     <p:embeddedFont>
       <p:font typeface="Verdana" panose="020B0604030504040204" pitchFamily="34" charset="0"/>
-      <p:regular r:id="rId12"/>
-      <p:bold r:id="rId13"/>
-      <p:italic r:id="rId14"/>
-      <p:boldItalic r:id="rId15"/>
+      <p:regular r:id="rId13"/>
+      <p:bold r:id="rId14"/>
+      <p:italic r:id="rId15"/>
+      <p:boldItalic r:id="rId16"/>
     </p:embeddedFont>
     <p:embeddedFont>
       <p:font typeface="Source Code Pro" panose="020B0604020202020204" charset="0"/>
-      <p:regular r:id="rId16"/>
-      <p:bold r:id="rId17"/>
+      <p:regular r:id="rId17"/>
+      <p:bold r:id="rId18"/>
     </p:embeddedFont>
   </p:embeddedFontLst>
   <p:defaultTextStyle>
@@ -236,6 +237,22 @@
       </a:defRPr>
     </a:lvl9pPr>
   </p:defaultTextStyle>
+  <p:extLst>
+    <p:ext uri="{EFAFB233-063F-42B5-8137-9DF3F51BA10A}">
+      <p15:sldGuideLst xmlns:p15="http://schemas.microsoft.com/office/powerpoint/2012/main">
+        <p15:guide id="1" orient="horz" pos="1620">
+          <p15:clr>
+            <a:srgbClr val="A4A3A4"/>
+          </p15:clr>
+        </p15:guide>
+        <p15:guide id="2" pos="2880">
+          <p15:clr>
+            <a:srgbClr val="A4A3A4"/>
+          </p15:clr>
+        </p15:guide>
+      </p15:sldGuideLst>
+    </p:ext>
+  </p:extLst>
 </p:presentation>
 </file>
 
@@ -595,6 +612,11 @@
         </p:txBody>
       </p:sp>
     </p:spTree>
+    <p:extLst>
+      <p:ext uri="{BB962C8B-B14F-4D97-AF65-F5344CB8AC3E}">
+        <p14:creationId xmlns:p14="http://schemas.microsoft.com/office/powerpoint/2010/main" val="1115409243"/>
+      </p:ext>
+    </p:extLst>
   </p:cSld>
   <p:clrMapOvr>
     <a:masterClrMapping/>
@@ -691,11 +713,176 @@
               </a:spcBef>
               <a:buNone/>
             </a:pPr>
-            <a:endParaRPr/>
+            <a:r>
+              <a:rPr lang="en-SG" dirty="0" smtClean="0"/>
+              <a:t>Thank</a:t>
+            </a:r>
+            <a:r>
+              <a:rPr lang="en-SG" baseline="0" dirty="0" smtClean="0"/>
+              <a:t> you </a:t>
+            </a:r>
+            <a:r>
+              <a:rPr lang="en-SG" baseline="0" dirty="0" err="1" smtClean="0"/>
+              <a:t>Riwu</a:t>
+            </a:r>
+            <a:r>
+              <a:rPr lang="en-SG" baseline="0" dirty="0" smtClean="0"/>
+              <a:t> and good afternoon everyone. I am Julian, and I will be bringing all of you through the add and edit capabilities of WURI. First off, WURI’s add feature is amazingly simple, built with the sole purpose of allowing users to add tasks with minimal effort. As showing will definitely bring more clarity than seeing, let us jump right into it! </a:t>
+            </a:r>
+          </a:p>
+          <a:p>
+            <a:pPr lvl="0">
+              <a:spcBef>
+                <a:spcPts val="0"/>
+              </a:spcBef>
+              <a:buNone/>
+            </a:pPr>
+            <a:r>
+              <a:rPr lang="en-SG" baseline="0" dirty="0" smtClean="0"/>
+              <a:t>Now, imagine that you want to read some books in your free time, at your own pace.</a:t>
+            </a:r>
+            <a:br>
+              <a:rPr lang="en-SG" baseline="0" dirty="0" smtClean="0"/>
+            </a:br>
+            <a:r>
+              <a:rPr lang="en-SG" baseline="0" dirty="0" smtClean="0"/>
+              <a:t>You can simply type “Read books” into WURI for it to be recorded down for you!</a:t>
+            </a:r>
+          </a:p>
+          <a:p>
+            <a:pPr lvl="0">
+              <a:spcBef>
+                <a:spcPts val="0"/>
+              </a:spcBef>
+              <a:buNone/>
+            </a:pPr>
+            <a:r>
+              <a:rPr lang="en-SG" baseline="0" dirty="0" smtClean="0"/>
+              <a:t>Now, lets just say that you are meeting a friend for lunch on this Saturday.</a:t>
+            </a:r>
+            <a:br>
+              <a:rPr lang="en-SG" baseline="0" dirty="0" smtClean="0"/>
+            </a:br>
+            <a:r>
+              <a:rPr lang="en-SG" baseline="0" dirty="0" smtClean="0"/>
+              <a:t>Simply type “Meet friend Saturday 12pm” to record it down into WURI.</a:t>
+            </a:r>
+          </a:p>
+          <a:p>
+            <a:pPr lvl="0">
+              <a:spcBef>
+                <a:spcPts val="0"/>
+              </a:spcBef>
+              <a:buNone/>
+            </a:pPr>
+            <a:r>
+              <a:rPr lang="en-SG" baseline="0" dirty="0" smtClean="0"/>
+              <a:t>Tada, isn’t it amazing?</a:t>
+            </a:r>
+          </a:p>
+          <a:p>
+            <a:pPr lvl="0">
+              <a:spcBef>
+                <a:spcPts val="0"/>
+              </a:spcBef>
+              <a:buNone/>
+            </a:pPr>
+            <a:r>
+              <a:rPr lang="en-SG" baseline="0" dirty="0" smtClean="0"/>
+              <a:t>Moving on, how many of us here have work due by the end of almost every week?</a:t>
+            </a:r>
+          </a:p>
+          <a:p>
+            <a:pPr lvl="0">
+              <a:spcBef>
+                <a:spcPts val="0"/>
+              </a:spcBef>
+              <a:buNone/>
+            </a:pPr>
+            <a:r>
+              <a:rPr lang="en-SG" baseline="0" dirty="0" smtClean="0"/>
+              <a:t>For me I often have work due by the midnight of Sunday. If you face a similar situation, no problem! Just type “Do work Sunday 23:59 1w” and WURI will now record this task every week on Sunday. If Sunday has passed and you want to move the deadline to the next weekend, simply type “d 1” to delete last Sunday’s task, bringing forth to the next week. I will leave </a:t>
+            </a:r>
+            <a:r>
+              <a:rPr lang="en-SG" baseline="0" dirty="0" err="1" smtClean="0"/>
+              <a:t>Ruomu</a:t>
+            </a:r>
+            <a:r>
+              <a:rPr lang="en-SG" baseline="0" dirty="0" smtClean="0"/>
+              <a:t> to discuss the rest of deletion later.</a:t>
+            </a:r>
+          </a:p>
+          <a:p>
+            <a:pPr lvl="0">
+              <a:spcBef>
+                <a:spcPts val="0"/>
+              </a:spcBef>
+              <a:buNone/>
+            </a:pPr>
+            <a:endParaRPr lang="en-SG" baseline="0" dirty="0" smtClean="0"/>
+          </a:p>
+          <a:p>
+            <a:pPr lvl="0">
+              <a:spcBef>
+                <a:spcPts val="0"/>
+              </a:spcBef>
+              <a:buNone/>
+            </a:pPr>
+            <a:r>
+              <a:rPr lang="en-SG" baseline="0" dirty="0" smtClean="0"/>
+              <a:t>Now imagine if your meeting with your friend got rescheduled to Thursday instead. Simply type “e 1 </a:t>
+            </a:r>
+            <a:r>
+              <a:rPr lang="en-SG" baseline="0" dirty="0" err="1" smtClean="0"/>
+              <a:t>thurs</a:t>
+            </a:r>
+            <a:r>
+              <a:rPr lang="en-SG" baseline="0" dirty="0" smtClean="0"/>
+              <a:t>” and the date will be edited accordingly.</a:t>
+            </a:r>
+            <a:br>
+              <a:rPr lang="en-SG" baseline="0" dirty="0" smtClean="0"/>
+            </a:br>
+            <a:r>
+              <a:rPr lang="en-SG" baseline="0" dirty="0" smtClean="0"/>
+              <a:t>Now what if your friend suddenly says that he can only make it for dinner as it is a weekday? Fret not! Type “e 1 7pm” and the new time will be reflected in WURI.</a:t>
+            </a:r>
+          </a:p>
+          <a:p>
+            <a:pPr lvl="0">
+              <a:spcBef>
+                <a:spcPts val="0"/>
+              </a:spcBef>
+              <a:buNone/>
+            </a:pPr>
+            <a:r>
+              <a:rPr lang="en-SG" baseline="0" dirty="0" smtClean="0"/>
+              <a:t>Lastly, imagine that your workload has increased and that you now have work due every 3 days! We totally understand that at this point, you do not have the time to fiddle around with fanciful commands, so we’ve kept it short and sweet. Simply type “e 2 3d” for your deadlines to now be set every 3 days!</a:t>
+            </a:r>
+            <a:br>
+              <a:rPr lang="en-SG" baseline="0" dirty="0" smtClean="0"/>
+            </a:br>
+            <a:r>
+              <a:rPr lang="en-SG" baseline="0" dirty="0" smtClean="0"/>
+              <a:t>I will now be passing the time over to </a:t>
+            </a:r>
+            <a:r>
+              <a:rPr lang="en-SG" baseline="0" dirty="0" err="1" smtClean="0"/>
+              <a:t>Ruomu</a:t>
+            </a:r>
+            <a:r>
+              <a:rPr lang="en-SG" baseline="0" dirty="0" smtClean="0"/>
+              <a:t> to talk about the rest of WURI’s capabilities.</a:t>
+            </a:r>
           </a:p>
         </p:txBody>
       </p:sp>
     </p:spTree>
+    <p:extLst>
+      <p:ext uri="{BB962C8B-B14F-4D97-AF65-F5344CB8AC3E}">
+        <p14:creationId xmlns:p14="http://schemas.microsoft.com/office/powerpoint/2010/main" val="4004960693"/>
+      </p:ext>
+    </p:extLst>
   </p:cSld>
   <p:clrMapOvr>
     <a:masterClrMapping/>
@@ -708,7 +895,7 @@
   <p:cSld>
     <p:spTree>
       <p:nvGrpSpPr>
-        <p:cNvPr id="1" name="Shape 75"/>
+        <p:cNvPr id="1" name="Shape 68"/>
         <p:cNvGrpSpPr/>
         <p:nvPr/>
       </p:nvGrpSpPr>
@@ -722,7 +909,7 @@
       </p:grpSpPr>
       <p:sp>
         <p:nvSpPr>
-          <p:cNvPr id="76" name="Shape 76"/>
+          <p:cNvPr id="69" name="Shape 69"/>
           <p:cNvSpPr>
             <a:spLocks noGrp="1" noRot="1" noChangeAspect="1"/>
           </p:cNvSpPr>
@@ -763,7 +950,7 @@
       </p:sp>
       <p:sp>
         <p:nvSpPr>
-          <p:cNvPr id="77" name="Shape 77"/>
+          <p:cNvPr id="70" name="Shape 70"/>
           <p:cNvSpPr txBox="1">
             <a:spLocks noGrp="1"/>
           </p:cNvSpPr>
@@ -792,11 +979,16 @@
               </a:spcBef>
               <a:buNone/>
             </a:pPr>
-            <a:endParaRPr/>
+            <a:endParaRPr dirty="0"/>
           </a:p>
         </p:txBody>
       </p:sp>
     </p:spTree>
+    <p:extLst>
+      <p:ext uri="{BB962C8B-B14F-4D97-AF65-F5344CB8AC3E}">
+        <p14:creationId xmlns:p14="http://schemas.microsoft.com/office/powerpoint/2010/main" val="2130086438"/>
+      </p:ext>
+    </p:extLst>
   </p:cSld>
   <p:clrMapOvr>
     <a:masterClrMapping/>
@@ -809,7 +1001,7 @@
   <p:cSld>
     <p:spTree>
       <p:nvGrpSpPr>
-        <p:cNvPr id="1" name="Shape 86"/>
+        <p:cNvPr id="1" name="Shape 75"/>
         <p:cNvGrpSpPr/>
         <p:nvPr/>
       </p:nvGrpSpPr>
@@ -823,7 +1015,7 @@
       </p:grpSpPr>
       <p:sp>
         <p:nvSpPr>
-          <p:cNvPr id="87" name="Shape 87"/>
+          <p:cNvPr id="76" name="Shape 76"/>
           <p:cNvSpPr>
             <a:spLocks noGrp="1" noRot="1" noChangeAspect="1"/>
           </p:cNvSpPr>
@@ -864,7 +1056,7 @@
       </p:sp>
       <p:sp>
         <p:nvSpPr>
-          <p:cNvPr id="88" name="Shape 88"/>
+          <p:cNvPr id="77" name="Shape 77"/>
           <p:cNvSpPr txBox="1">
             <a:spLocks noGrp="1"/>
           </p:cNvSpPr>
@@ -893,11 +1085,16 @@
               </a:spcBef>
               <a:buNone/>
             </a:pPr>
-            <a:endParaRPr/>
+            <a:endParaRPr dirty="0"/>
           </a:p>
         </p:txBody>
       </p:sp>
     </p:spTree>
+    <p:extLst>
+      <p:ext uri="{BB962C8B-B14F-4D97-AF65-F5344CB8AC3E}">
+        <p14:creationId xmlns:p14="http://schemas.microsoft.com/office/powerpoint/2010/main" val="1888858988"/>
+      </p:ext>
+    </p:extLst>
   </p:cSld>
   <p:clrMapOvr>
     <a:masterClrMapping/>
@@ -910,7 +1107,7 @@
   <p:cSld>
     <p:spTree>
       <p:nvGrpSpPr>
-        <p:cNvPr id="1" name="Shape 95"/>
+        <p:cNvPr id="1" name="Shape 86"/>
         <p:cNvGrpSpPr/>
         <p:nvPr/>
       </p:nvGrpSpPr>
@@ -924,7 +1121,7 @@
       </p:grpSpPr>
       <p:sp>
         <p:nvSpPr>
-          <p:cNvPr id="96" name="Shape 96"/>
+          <p:cNvPr id="87" name="Shape 87"/>
           <p:cNvSpPr>
             <a:spLocks noGrp="1" noRot="1" noChangeAspect="1"/>
           </p:cNvSpPr>
@@ -965,7 +1162,7 @@
       </p:sp>
       <p:sp>
         <p:nvSpPr>
-          <p:cNvPr id="97" name="Shape 97"/>
+          <p:cNvPr id="88" name="Shape 88"/>
           <p:cNvSpPr txBox="1">
             <a:spLocks noGrp="1"/>
           </p:cNvSpPr>
@@ -999,6 +1196,11 @@
         </p:txBody>
       </p:sp>
     </p:spTree>
+    <p:extLst>
+      <p:ext uri="{BB962C8B-B14F-4D97-AF65-F5344CB8AC3E}">
+        <p14:creationId xmlns:p14="http://schemas.microsoft.com/office/powerpoint/2010/main" val="1812763220"/>
+      </p:ext>
+    </p:extLst>
   </p:cSld>
   <p:clrMapOvr>
     <a:masterClrMapping/>
@@ -1011,7 +1213,7 @@
   <p:cSld>
     <p:spTree>
       <p:nvGrpSpPr>
-        <p:cNvPr id="1" name="Shape 108"/>
+        <p:cNvPr id="1" name="Shape 95"/>
         <p:cNvGrpSpPr/>
         <p:nvPr/>
       </p:nvGrpSpPr>
@@ -1025,7 +1227,7 @@
       </p:grpSpPr>
       <p:sp>
         <p:nvSpPr>
-          <p:cNvPr id="109" name="Shape 109"/>
+          <p:cNvPr id="96" name="Shape 96"/>
           <p:cNvSpPr>
             <a:spLocks noGrp="1" noRot="1" noChangeAspect="1"/>
           </p:cNvSpPr>
@@ -1066,7 +1268,7 @@
       </p:sp>
       <p:sp>
         <p:nvSpPr>
-          <p:cNvPr id="110" name="Shape 110"/>
+          <p:cNvPr id="97" name="Shape 97"/>
           <p:cNvSpPr txBox="1">
             <a:spLocks noGrp="1"/>
           </p:cNvSpPr>
@@ -1100,6 +1302,11 @@
         </p:txBody>
       </p:sp>
     </p:spTree>
+    <p:extLst>
+      <p:ext uri="{BB962C8B-B14F-4D97-AF65-F5344CB8AC3E}">
+        <p14:creationId xmlns:p14="http://schemas.microsoft.com/office/powerpoint/2010/main" val="1799691028"/>
+      </p:ext>
+    </p:extLst>
   </p:cSld>
   <p:clrMapOvr>
     <a:masterClrMapping/>
@@ -1201,6 +1408,11 @@
         </p:txBody>
       </p:sp>
     </p:spTree>
+    <p:extLst>
+      <p:ext uri="{BB962C8B-B14F-4D97-AF65-F5344CB8AC3E}">
+        <p14:creationId xmlns:p14="http://schemas.microsoft.com/office/powerpoint/2010/main" val="1692111521"/>
+      </p:ext>
+    </p:extLst>
   </p:cSld>
   <p:clrMapOvr>
     <a:masterClrMapping/>
@@ -1213,7 +1425,7 @@
   <p:cSld>
     <p:spTree>
       <p:nvGrpSpPr>
-        <p:cNvPr id="1" name="Shape 115"/>
+        <p:cNvPr id="1" name="Shape 108"/>
         <p:cNvGrpSpPr/>
         <p:nvPr/>
       </p:nvGrpSpPr>
@@ -1227,7 +1439,7 @@
       </p:grpSpPr>
       <p:sp>
         <p:nvSpPr>
-          <p:cNvPr id="116" name="Shape 116"/>
+          <p:cNvPr id="109" name="Shape 109"/>
           <p:cNvSpPr>
             <a:spLocks noGrp="1" noRot="1" noChangeAspect="1"/>
           </p:cNvSpPr>
@@ -1268,6 +1480,112 @@
       </p:sp>
       <p:sp>
         <p:nvSpPr>
+          <p:cNvPr id="110" name="Shape 110"/>
+          <p:cNvSpPr txBox="1">
+            <a:spLocks noGrp="1"/>
+          </p:cNvSpPr>
+          <p:nvPr>
+            <p:ph type="body" idx="1"/>
+          </p:nvPr>
+        </p:nvSpPr>
+        <p:spPr>
+          <a:xfrm>
+            <a:off x="685800" y="4343400"/>
+            <a:ext cx="5486400" cy="4114800"/>
+          </a:xfrm>
+          <a:prstGeom prst="rect">
+            <a:avLst/>
+          </a:prstGeom>
+        </p:spPr>
+        <p:txBody>
+          <a:bodyPr lIns="91425" tIns="91425" rIns="91425" bIns="91425" anchor="t" anchorCtr="0">
+            <a:noAutofit/>
+          </a:bodyPr>
+          <a:lstStyle/>
+          <a:p>
+            <a:pPr lvl="0">
+              <a:spcBef>
+                <a:spcPts val="0"/>
+              </a:spcBef>
+              <a:buNone/>
+            </a:pPr>
+            <a:endParaRPr/>
+          </a:p>
+        </p:txBody>
+      </p:sp>
+    </p:spTree>
+    <p:extLst>
+      <p:ext uri="{BB962C8B-B14F-4D97-AF65-F5344CB8AC3E}">
+        <p14:creationId xmlns:p14="http://schemas.microsoft.com/office/powerpoint/2010/main" val="4284199866"/>
+      </p:ext>
+    </p:extLst>
+  </p:cSld>
+  <p:clrMapOvr>
+    <a:masterClrMapping/>
+  </p:clrMapOvr>
+</p:notes>
+</file>
+
+<file path=ppt/notesSlides/notesSlide9.xml><?xml version="1.0" encoding="utf-8"?>
+<p:notes xmlns:a="http://schemas.openxmlformats.org/drawingml/2006/main" xmlns:r="http://schemas.openxmlformats.org/officeDocument/2006/relationships" xmlns:p="http://schemas.openxmlformats.org/presentationml/2006/main" showMasterSp="0" showMasterPhAnim="0">
+  <p:cSld>
+    <p:spTree>
+      <p:nvGrpSpPr>
+        <p:cNvPr id="1" name="Shape 115"/>
+        <p:cNvGrpSpPr/>
+        <p:nvPr/>
+      </p:nvGrpSpPr>
+      <p:grpSpPr>
+        <a:xfrm>
+          <a:off x="0" y="0"/>
+          <a:ext cx="0" cy="0"/>
+          <a:chOff x="0" y="0"/>
+          <a:chExt cx="0" cy="0"/>
+        </a:xfrm>
+      </p:grpSpPr>
+      <p:sp>
+        <p:nvSpPr>
+          <p:cNvPr id="116" name="Shape 116"/>
+          <p:cNvSpPr>
+            <a:spLocks noGrp="1" noRot="1" noChangeAspect="1"/>
+          </p:cNvSpPr>
+          <p:nvPr>
+            <p:ph type="sldImg" idx="2"/>
+          </p:nvPr>
+        </p:nvSpPr>
+        <p:spPr>
+          <a:xfrm>
+            <a:off x="381000" y="685800"/>
+            <a:ext cx="6096000" cy="3429000"/>
+          </a:xfrm>
+          <a:custGeom>
+            <a:avLst/>
+            <a:gdLst/>
+            <a:ahLst/>
+            <a:cxnLst/>
+            <a:rect l="0" t="0" r="0" b="0"/>
+            <a:pathLst>
+              <a:path w="120000" h="120000" extrusionOk="0">
+                <a:moveTo>
+                  <a:pt x="0" y="0"/>
+                </a:moveTo>
+                <a:lnTo>
+                  <a:pt x="120000" y="0"/>
+                </a:lnTo>
+                <a:lnTo>
+                  <a:pt x="120000" y="120000"/>
+                </a:lnTo>
+                <a:lnTo>
+                  <a:pt x="0" y="120000"/>
+                </a:lnTo>
+                <a:close/>
+              </a:path>
+            </a:pathLst>
+          </a:custGeom>
+        </p:spPr>
+      </p:sp>
+      <p:sp>
+        <p:nvSpPr>
           <p:cNvPr id="117" name="Shape 117"/>
           <p:cNvSpPr txBox="1">
             <a:spLocks noGrp="1"/>
@@ -1302,6 +1620,11 @@
         </p:txBody>
       </p:sp>
     </p:spTree>
+    <p:extLst>
+      <p:ext uri="{BB962C8B-B14F-4D97-AF65-F5344CB8AC3E}">
+        <p14:creationId xmlns:p14="http://schemas.microsoft.com/office/powerpoint/2010/main" val="1437425740"/>
+      </p:ext>
+    </p:extLst>
   </p:cSld>
   <p:clrMapOvr>
     <a:masterClrMapping/>
@@ -5151,6 +5474,111 @@
 </p:sld>
 </file>
 
+<file path=ppt/slides/slide10.xml><?xml version="1.0" encoding="utf-8"?>
+<p:sld xmlns:a="http://schemas.openxmlformats.org/drawingml/2006/main" xmlns:r="http://schemas.openxmlformats.org/officeDocument/2006/relationships" xmlns:p="http://schemas.openxmlformats.org/presentationml/2006/main">
+  <p:cSld>
+    <p:spTree>
+      <p:nvGrpSpPr>
+        <p:cNvPr id="1" name="Shape 118"/>
+        <p:cNvGrpSpPr/>
+        <p:nvPr/>
+      </p:nvGrpSpPr>
+      <p:grpSpPr>
+        <a:xfrm>
+          <a:off x="0" y="0"/>
+          <a:ext cx="0" cy="0"/>
+          <a:chOff x="0" y="0"/>
+          <a:chExt cx="0" cy="0"/>
+        </a:xfrm>
+      </p:grpSpPr>
+      <p:sp>
+        <p:nvSpPr>
+          <p:cNvPr id="119" name="Shape 119"/>
+          <p:cNvSpPr txBox="1">
+            <a:spLocks noGrp="1"/>
+          </p:cNvSpPr>
+          <p:nvPr>
+            <p:ph type="title"/>
+          </p:nvPr>
+        </p:nvSpPr>
+        <p:spPr>
+          <a:prstGeom prst="rect">
+            <a:avLst/>
+          </a:prstGeom>
+        </p:spPr>
+        <p:txBody>
+          <a:bodyPr lIns="91425" tIns="91425" rIns="91425" bIns="91425" anchor="t" anchorCtr="0">
+            <a:noAutofit/>
+          </a:bodyPr>
+          <a:lstStyle/>
+          <a:p>
+            <a:pPr lvl="0">
+              <a:spcBef>
+                <a:spcPts val="0"/>
+              </a:spcBef>
+              <a:buNone/>
+            </a:pPr>
+            <a:r>
+              <a:rPr lang="en" b="0">
+                <a:latin typeface="Verdana"/>
+                <a:ea typeface="Verdana"/>
+                <a:cs typeface="Verdana"/>
+                <a:sym typeface="Verdana"/>
+              </a:rPr>
+              <a:t>Questions?</a:t>
+            </a:r>
+          </a:p>
+        </p:txBody>
+      </p:sp>
+      <p:sp>
+        <p:nvSpPr>
+          <p:cNvPr id="120" name="Shape 120"/>
+          <p:cNvSpPr txBox="1">
+            <a:spLocks noGrp="1"/>
+          </p:cNvSpPr>
+          <p:nvPr>
+            <p:ph type="body" idx="1"/>
+          </p:nvPr>
+        </p:nvSpPr>
+        <p:spPr>
+          <a:prstGeom prst="rect">
+            <a:avLst/>
+          </a:prstGeom>
+        </p:spPr>
+        <p:txBody>
+          <a:bodyPr lIns="91425" tIns="91425" rIns="91425" bIns="91425" anchor="t" anchorCtr="0">
+            <a:noAutofit/>
+          </a:bodyPr>
+          <a:lstStyle/>
+          <a:p>
+            <a:pPr lvl="0" rtl="0">
+              <a:spcBef>
+                <a:spcPts val="0"/>
+              </a:spcBef>
+              <a:buNone/>
+            </a:pPr>
+            <a:endParaRPr/>
+          </a:p>
+        </p:txBody>
+      </p:sp>
+    </p:spTree>
+  </p:cSld>
+  <p:clrMapOvr>
+    <a:masterClrMapping/>
+  </p:clrMapOvr>
+  <p:transition spd="slow">
+    <p:cut/>
+  </p:transition>
+  <p:timing>
+    <p:tnLst>
+      <p:par>
+        <p:cTn id="1" dur="indefinite" restart="never" nodeType="tmRoot"/>
+      </p:par>
+    </p:tnLst>
+  </p:timing>
+</p:sld>
+</file>
+
 <file path=ppt/slides/slide2.xml><?xml version="1.0" encoding="utf-8"?>
 <p:sld xmlns:a="http://schemas.openxmlformats.org/drawingml/2006/main" xmlns:r="http://schemas.openxmlformats.org/officeDocument/2006/relationships" xmlns:p="http://schemas.openxmlformats.org/presentationml/2006/main">
   <p:cSld>
@@ -5196,14 +5624,20 @@
               <a:buNone/>
             </a:pPr>
             <a:r>
-              <a:rPr lang="en" b="0" dirty="0">
+              <a:rPr lang="en" b="0" dirty="0" smtClean="0">
                 <a:latin typeface="Verdana"/>
                 <a:ea typeface="Verdana"/>
                 <a:cs typeface="Verdana"/>
                 <a:sym typeface="Verdana"/>
               </a:rPr>
-              <a:t>Storage	</a:t>
-            </a:r>
+              <a:t>Adding and Editing</a:t>
+            </a:r>
+            <a:endParaRPr lang="en" b="0" dirty="0">
+              <a:latin typeface="Verdana"/>
+              <a:ea typeface="Verdana"/>
+              <a:cs typeface="Verdana"/>
+              <a:sym typeface="Verdana"/>
+            </a:endParaRPr>
           </a:p>
         </p:txBody>
       </p:sp>
@@ -5234,12 +5668,12 @@
               </a:spcBef>
             </a:pPr>
             <a:r>
-              <a:rPr lang="en" dirty="0">
+              <a:rPr lang="en" dirty="0" smtClean="0">
                 <a:latin typeface="Verdana" panose="020B0604030504040204" pitchFamily="34" charset="0"/>
                 <a:ea typeface="Verdana" panose="020B0604030504040204" pitchFamily="34" charset="0"/>
                 <a:cs typeface="Verdana" panose="020B0604030504040204" pitchFamily="34" charset="0"/>
               </a:rPr>
-              <a:t>Extensible Markup Language (XML)</a:t>
+              <a:t>Simple</a:t>
             </a:r>
           </a:p>
           <a:p>
@@ -5249,59 +5683,27 @@
               </a:spcBef>
             </a:pPr>
             <a:r>
-              <a:rPr lang="en" dirty="0">
+              <a:rPr lang="en" dirty="0" smtClean="0">
                 <a:latin typeface="Verdana" panose="020B0604030504040204" pitchFamily="34" charset="0"/>
                 <a:ea typeface="Verdana" panose="020B0604030504040204" pitchFamily="34" charset="0"/>
                 <a:cs typeface="Verdana" panose="020B0604030504040204" pitchFamily="34" charset="0"/>
               </a:rPr>
-              <a:t>Simple structure</a:t>
-            </a:r>
-          </a:p>
-          <a:p>
-            <a:pPr marL="457200" lvl="0" indent="-228600">
-              <a:spcBef>
-                <a:spcPts val="0"/>
-              </a:spcBef>
-            </a:pPr>
-            <a:r>
-              <a:rPr lang="en" dirty="0">
-                <a:latin typeface="Verdana" panose="020B0604030504040204" pitchFamily="34" charset="0"/>
-                <a:ea typeface="Verdana" panose="020B0604030504040204" pitchFamily="34" charset="0"/>
-                <a:cs typeface="Verdana" panose="020B0604030504040204" pitchFamily="34" charset="0"/>
-              </a:rPr>
-              <a:t>Easy to edit</a:t>
-            </a:r>
-          </a:p>
-        </p:txBody>
-      </p:sp>
-      <p:pic>
-        <p:nvPicPr>
-          <p:cNvPr id="74" name="Shape 74"/>
-          <p:cNvPicPr preferRelativeResize="0"/>
-          <p:nvPr/>
-        </p:nvPicPr>
-        <p:blipFill rotWithShape="1">
-          <a:blip r:embed="rId3">
-            <a:alphaModFix/>
-          </a:blip>
-          <a:srcRect l="41270" t="36568" r="30713" b="34822"/>
-          <a:stretch/>
-        </p:blipFill>
-        <p:spPr>
-          <a:xfrm>
-            <a:off x="3993075" y="1995812"/>
-            <a:ext cx="4657699" cy="2675424"/>
-          </a:xfrm>
-          <a:prstGeom prst="rect">
-            <a:avLst/>
-          </a:prstGeom>
-          <a:noFill/>
-          <a:ln>
-            <a:noFill/>
-          </a:ln>
-        </p:spPr>
-      </p:pic>
+              <a:t>Minimal effort</a:t>
+            </a:r>
+            <a:endParaRPr lang="en" dirty="0">
+              <a:latin typeface="Verdana" panose="020B0604030504040204" pitchFamily="34" charset="0"/>
+              <a:ea typeface="Verdana" panose="020B0604030504040204" pitchFamily="34" charset="0"/>
+              <a:cs typeface="Verdana" panose="020B0604030504040204" pitchFamily="34" charset="0"/>
+            </a:endParaRPr>
+          </a:p>
+        </p:txBody>
+      </p:sp>
     </p:spTree>
+    <p:extLst>
+      <p:ext uri="{BB962C8B-B14F-4D97-AF65-F5344CB8AC3E}">
+        <p14:creationId xmlns:p14="http://schemas.microsoft.com/office/powerpoint/2010/main" val="1476971637"/>
+      </p:ext>
+    </p:extLst>
   </p:cSld>
   <p:clrMapOvr>
     <a:masterClrMapping/>
@@ -5324,7 +5726,7 @@
   <p:cSld>
     <p:spTree>
       <p:nvGrpSpPr>
-        <p:cNvPr id="1" name="Shape 78"/>
+        <p:cNvPr id="1" name="Shape 71"/>
         <p:cNvGrpSpPr/>
         <p:nvPr/>
       </p:nvGrpSpPr>
@@ -5338,50 +5740,7 @@
       </p:grpSpPr>
       <p:sp>
         <p:nvSpPr>
-          <p:cNvPr id="79" name="Shape 79"/>
-          <p:cNvSpPr/>
-          <p:nvPr/>
-        </p:nvSpPr>
-        <p:spPr>
-          <a:xfrm>
-            <a:off x="2147024" y="976550"/>
-            <a:ext cx="4053240" cy="1819260"/>
-          </a:xfrm>
-          <a:prstGeom prst="cloud">
-            <a:avLst/>
-          </a:prstGeom>
-          <a:solidFill>
-            <a:schemeClr val="lt1"/>
-          </a:solidFill>
-          <a:ln w="38100" cap="flat" cmpd="sng">
-            <a:solidFill>
-              <a:srgbClr val="C9DAF8"/>
-            </a:solidFill>
-            <a:prstDash val="solid"/>
-            <a:round/>
-            <a:headEnd type="none" w="med" len="med"/>
-            <a:tailEnd type="none" w="med" len="med"/>
-          </a:ln>
-        </p:spPr>
-        <p:txBody>
-          <a:bodyPr lIns="91425" tIns="91425" rIns="91425" bIns="91425" anchor="ctr" anchorCtr="0">
-            <a:noAutofit/>
-          </a:bodyPr>
-          <a:lstStyle/>
-          <a:p>
-            <a:pPr lvl="0">
-              <a:spcBef>
-                <a:spcPts val="0"/>
-              </a:spcBef>
-              <a:buNone/>
-            </a:pPr>
-            <a:endParaRPr/>
-          </a:p>
-        </p:txBody>
-      </p:sp>
-      <p:sp>
-        <p:nvSpPr>
-          <p:cNvPr id="80" name="Shape 80"/>
+          <p:cNvPr id="72" name="Shape 72"/>
           <p:cNvSpPr txBox="1">
             <a:spLocks noGrp="1"/>
           </p:cNvSpPr>
@@ -5407,199 +5766,101 @@
               <a:buNone/>
             </a:pPr>
             <a:r>
-              <a:rPr lang="en" b="0">
+              <a:rPr lang="en" b="0" dirty="0">
                 <a:latin typeface="Verdana"/>
                 <a:ea typeface="Verdana"/>
                 <a:cs typeface="Verdana"/>
                 <a:sym typeface="Verdana"/>
               </a:rPr>
-              <a:t>Storage</a:t>
+              <a:t>Storage	</a:t>
+            </a:r>
+          </a:p>
+        </p:txBody>
+      </p:sp>
+      <p:sp>
+        <p:nvSpPr>
+          <p:cNvPr id="73" name="Shape 73"/>
+          <p:cNvSpPr txBox="1">
+            <a:spLocks noGrp="1"/>
+          </p:cNvSpPr>
+          <p:nvPr>
+            <p:ph type="body" idx="1"/>
+          </p:nvPr>
+        </p:nvSpPr>
+        <p:spPr>
+          <a:prstGeom prst="rect">
+            <a:avLst/>
+          </a:prstGeom>
+        </p:spPr>
+        <p:txBody>
+          <a:bodyPr lIns="91425" tIns="91425" rIns="91425" bIns="91425" anchor="t" anchorCtr="0">
+            <a:noAutofit/>
+          </a:bodyPr>
+          <a:lstStyle/>
+          <a:p>
+            <a:pPr marL="457200" lvl="0" indent="-228600" rtl="0">
+              <a:spcBef>
+                <a:spcPts val="0"/>
+              </a:spcBef>
+            </a:pPr>
+            <a:r>
+              <a:rPr lang="en" dirty="0">
+                <a:latin typeface="Verdana" panose="020B0604030504040204" pitchFamily="34" charset="0"/>
+                <a:ea typeface="Verdana" panose="020B0604030504040204" pitchFamily="34" charset="0"/>
+                <a:cs typeface="Verdana" panose="020B0604030504040204" pitchFamily="34" charset="0"/>
+              </a:rPr>
+              <a:t>Extensible Markup Language (XML)</a:t>
+            </a:r>
+          </a:p>
+          <a:p>
+            <a:pPr marL="457200" lvl="0" indent="-228600" rtl="0">
+              <a:spcBef>
+                <a:spcPts val="0"/>
+              </a:spcBef>
+            </a:pPr>
+            <a:r>
+              <a:rPr lang="en" dirty="0">
+                <a:latin typeface="Verdana" panose="020B0604030504040204" pitchFamily="34" charset="0"/>
+                <a:ea typeface="Verdana" panose="020B0604030504040204" pitchFamily="34" charset="0"/>
+                <a:cs typeface="Verdana" panose="020B0604030504040204" pitchFamily="34" charset="0"/>
+              </a:rPr>
+              <a:t>Simple structure</a:t>
+            </a:r>
+          </a:p>
+          <a:p>
+            <a:pPr marL="457200" lvl="0" indent="-228600">
+              <a:spcBef>
+                <a:spcPts val="0"/>
+              </a:spcBef>
+            </a:pPr>
+            <a:r>
+              <a:rPr lang="en" dirty="0">
+                <a:latin typeface="Verdana" panose="020B0604030504040204" pitchFamily="34" charset="0"/>
+                <a:ea typeface="Verdana" panose="020B0604030504040204" pitchFamily="34" charset="0"/>
+                <a:cs typeface="Verdana" panose="020B0604030504040204" pitchFamily="34" charset="0"/>
+              </a:rPr>
+              <a:t>Easy to edit</a:t>
             </a:r>
           </a:p>
         </p:txBody>
       </p:sp>
       <p:pic>
         <p:nvPicPr>
-          <p:cNvPr id="81" name="Shape 81"/>
+          <p:cNvPr id="74" name="Shape 74"/>
           <p:cNvPicPr preferRelativeResize="0"/>
           <p:nvPr/>
         </p:nvPicPr>
-        <p:blipFill>
+        <p:blipFill rotWithShape="1">
           <a:blip r:embed="rId3">
-            <a:alphaModFix amt="57000"/>
-          </a:blip>
-          <a:stretch>
-            <a:fillRect/>
-          </a:stretch>
-        </p:blipFill>
-        <p:spPr>
-          <a:xfrm>
-            <a:off x="3492625" y="1155737"/>
-            <a:ext cx="1460874" cy="1460874"/>
-          </a:xfrm>
-          <a:prstGeom prst="rect">
-            <a:avLst/>
-          </a:prstGeom>
-          <a:noFill/>
-          <a:ln>
-            <a:noFill/>
-          </a:ln>
-        </p:spPr>
-      </p:pic>
-      <p:pic>
-        <p:nvPicPr>
-          <p:cNvPr id="82" name="Shape 82"/>
-          <p:cNvPicPr preferRelativeResize="0"/>
-          <p:nvPr/>
-        </p:nvPicPr>
-        <p:blipFill>
-          <a:blip r:embed="rId4">
             <a:alphaModFix/>
           </a:blip>
-          <a:stretch>
-            <a:fillRect/>
-          </a:stretch>
+          <a:srcRect l="41270" t="36568" r="30713" b="34822"/>
+          <a:stretch/>
         </p:blipFill>
         <p:spPr>
           <a:xfrm>
-            <a:off x="1043150" y="3363300"/>
-            <a:ext cx="2359575" cy="2359575"/>
-          </a:xfrm>
-          <a:prstGeom prst="rect">
-            <a:avLst/>
-          </a:prstGeom>
-          <a:noFill/>
-          <a:ln>
-            <a:noFill/>
-          </a:ln>
-        </p:spPr>
-      </p:pic>
-      <p:pic>
-        <p:nvPicPr>
-          <p:cNvPr id="83" name="Shape 83"/>
-          <p:cNvPicPr preferRelativeResize="0"/>
-          <p:nvPr/>
-        </p:nvPicPr>
-        <p:blipFill>
-          <a:blip r:embed="rId5">
-            <a:alphaModFix/>
-          </a:blip>
-          <a:stretch>
-            <a:fillRect/>
-          </a:stretch>
-        </p:blipFill>
-        <p:spPr>
-          <a:xfrm>
-            <a:off x="5378650" y="3115825"/>
-            <a:ext cx="2109975" cy="2109975"/>
-          </a:xfrm>
-          <a:prstGeom prst="rect">
-            <a:avLst/>
-          </a:prstGeom>
-          <a:noFill/>
-          <a:ln>
-            <a:noFill/>
-          </a:ln>
-        </p:spPr>
-      </p:pic>
-      <p:cxnSp>
-        <p:nvCxnSpPr>
-          <p:cNvPr id="84" name="Shape 84"/>
-          <p:cNvCxnSpPr/>
-          <p:nvPr/>
-        </p:nvCxnSpPr>
-        <p:spPr>
-          <a:xfrm flipV="1">
-            <a:off x="2843808" y="2653975"/>
-            <a:ext cx="677167" cy="709325"/>
-          </a:xfrm>
-          <a:prstGeom prst="straightConnector1">
-            <a:avLst/>
-          </a:prstGeom>
-          <a:noFill/>
-          <a:ln w="38100" cap="flat" cmpd="sng">
-            <a:solidFill>
-              <a:srgbClr val="9FC5E8"/>
-            </a:solidFill>
-            <a:prstDash val="solid"/>
-            <a:round/>
-            <a:headEnd type="none" w="lg" len="lg"/>
-            <a:tailEnd type="none" w="lg" len="lg"/>
-          </a:ln>
-        </p:spPr>
-      </p:cxnSp>
-      <p:cxnSp>
-        <p:nvCxnSpPr>
-          <p:cNvPr id="85" name="Shape 85"/>
-          <p:cNvCxnSpPr/>
-          <p:nvPr/>
-        </p:nvCxnSpPr>
-        <p:spPr>
-          <a:xfrm flipH="1" flipV="1">
-            <a:off x="5197450" y="2530500"/>
-            <a:ext cx="1174750" cy="905346"/>
-          </a:xfrm>
-          <a:prstGeom prst="straightConnector1">
-            <a:avLst/>
-          </a:prstGeom>
-          <a:noFill/>
-          <a:ln w="38100" cap="flat" cmpd="sng">
-            <a:solidFill>
-              <a:srgbClr val="9FC5E8"/>
-            </a:solidFill>
-            <a:prstDash val="solid"/>
-            <a:round/>
-            <a:headEnd type="none" w="lg" len="lg"/>
-            <a:tailEnd type="none" w="lg" len="lg"/>
-          </a:ln>
-        </p:spPr>
-      </p:cxnSp>
-      <p:pic>
-        <p:nvPicPr>
-          <p:cNvPr id="9" name="Shape 56"/>
-          <p:cNvPicPr preferRelativeResize="0"/>
-          <p:nvPr/>
-        </p:nvPicPr>
-        <p:blipFill>
-          <a:blip r:embed="rId6">
-            <a:alphaModFix/>
-          </a:blip>
-          <a:stretch>
-            <a:fillRect/>
-          </a:stretch>
-        </p:blipFill>
-        <p:spPr>
-          <a:xfrm>
-            <a:off x="1527203" y="3723878"/>
-            <a:ext cx="1391467" cy="602037"/>
-          </a:xfrm>
-          <a:prstGeom prst="rect">
-            <a:avLst/>
-          </a:prstGeom>
-          <a:noFill/>
-          <a:ln>
-            <a:noFill/>
-          </a:ln>
-        </p:spPr>
-      </p:pic>
-      <p:pic>
-        <p:nvPicPr>
-          <p:cNvPr id="10" name="Shape 56"/>
-          <p:cNvPicPr preferRelativeResize="0"/>
-          <p:nvPr/>
-        </p:nvPicPr>
-        <p:blipFill>
-          <a:blip r:embed="rId6">
-            <a:alphaModFix/>
-          </a:blip>
-          <a:stretch>
-            <a:fillRect/>
-          </a:stretch>
-        </p:blipFill>
-        <p:spPr>
-          <a:xfrm>
-            <a:off x="6200264" y="3735489"/>
-            <a:ext cx="1060658" cy="458908"/>
+            <a:off x="3993075" y="1995812"/>
+            <a:ext cx="4657699" cy="2675424"/>
           </a:xfrm>
           <a:prstGeom prst="rect">
             <a:avLst/>
@@ -5629,6 +5890,315 @@
 </file>
 
 <file path=ppt/slides/slide4.xml><?xml version="1.0" encoding="utf-8"?>
+<p:sld xmlns:a="http://schemas.openxmlformats.org/drawingml/2006/main" xmlns:r="http://schemas.openxmlformats.org/officeDocument/2006/relationships" xmlns:p="http://schemas.openxmlformats.org/presentationml/2006/main">
+  <p:cSld>
+    <p:spTree>
+      <p:nvGrpSpPr>
+        <p:cNvPr id="1" name="Shape 78"/>
+        <p:cNvGrpSpPr/>
+        <p:nvPr/>
+      </p:nvGrpSpPr>
+      <p:grpSpPr>
+        <a:xfrm>
+          <a:off x="0" y="0"/>
+          <a:ext cx="0" cy="0"/>
+          <a:chOff x="0" y="0"/>
+          <a:chExt cx="0" cy="0"/>
+        </a:xfrm>
+      </p:grpSpPr>
+      <p:sp>
+        <p:nvSpPr>
+          <p:cNvPr id="79" name="Shape 79"/>
+          <p:cNvSpPr/>
+          <p:nvPr/>
+        </p:nvSpPr>
+        <p:spPr>
+          <a:xfrm>
+            <a:off x="2147024" y="976550"/>
+            <a:ext cx="4053240" cy="1819260"/>
+          </a:xfrm>
+          <a:prstGeom prst="cloud">
+            <a:avLst/>
+          </a:prstGeom>
+          <a:solidFill>
+            <a:schemeClr val="lt1"/>
+          </a:solidFill>
+          <a:ln w="38100" cap="flat" cmpd="sng">
+            <a:solidFill>
+              <a:srgbClr val="C9DAF8"/>
+            </a:solidFill>
+            <a:prstDash val="solid"/>
+            <a:round/>
+            <a:headEnd type="none" w="med" len="med"/>
+            <a:tailEnd type="none" w="med" len="med"/>
+          </a:ln>
+        </p:spPr>
+        <p:txBody>
+          <a:bodyPr lIns="91425" tIns="91425" rIns="91425" bIns="91425" anchor="ctr" anchorCtr="0">
+            <a:noAutofit/>
+          </a:bodyPr>
+          <a:lstStyle/>
+          <a:p>
+            <a:pPr lvl="0">
+              <a:spcBef>
+                <a:spcPts val="0"/>
+              </a:spcBef>
+              <a:buNone/>
+            </a:pPr>
+            <a:endParaRPr/>
+          </a:p>
+        </p:txBody>
+      </p:sp>
+      <p:sp>
+        <p:nvSpPr>
+          <p:cNvPr id="80" name="Shape 80"/>
+          <p:cNvSpPr txBox="1">
+            <a:spLocks noGrp="1"/>
+          </p:cNvSpPr>
+          <p:nvPr>
+            <p:ph type="title"/>
+          </p:nvPr>
+        </p:nvSpPr>
+        <p:spPr>
+          <a:prstGeom prst="rect">
+            <a:avLst/>
+          </a:prstGeom>
+        </p:spPr>
+        <p:txBody>
+          <a:bodyPr lIns="91425" tIns="91425" rIns="91425" bIns="91425" anchor="t" anchorCtr="0">
+            <a:noAutofit/>
+          </a:bodyPr>
+          <a:lstStyle/>
+          <a:p>
+            <a:pPr lvl="0">
+              <a:spcBef>
+                <a:spcPts val="0"/>
+              </a:spcBef>
+              <a:buNone/>
+            </a:pPr>
+            <a:r>
+              <a:rPr lang="en" b="0">
+                <a:latin typeface="Verdana"/>
+                <a:ea typeface="Verdana"/>
+                <a:cs typeface="Verdana"/>
+                <a:sym typeface="Verdana"/>
+              </a:rPr>
+              <a:t>Storage</a:t>
+            </a:r>
+          </a:p>
+        </p:txBody>
+      </p:sp>
+      <p:pic>
+        <p:nvPicPr>
+          <p:cNvPr id="81" name="Shape 81"/>
+          <p:cNvPicPr preferRelativeResize="0"/>
+          <p:nvPr/>
+        </p:nvPicPr>
+        <p:blipFill>
+          <a:blip r:embed="rId3">
+            <a:alphaModFix amt="57000"/>
+          </a:blip>
+          <a:stretch>
+            <a:fillRect/>
+          </a:stretch>
+        </p:blipFill>
+        <p:spPr>
+          <a:xfrm>
+            <a:off x="3492625" y="1155737"/>
+            <a:ext cx="1460874" cy="1460874"/>
+          </a:xfrm>
+          <a:prstGeom prst="rect">
+            <a:avLst/>
+          </a:prstGeom>
+          <a:noFill/>
+          <a:ln>
+            <a:noFill/>
+          </a:ln>
+        </p:spPr>
+      </p:pic>
+      <p:pic>
+        <p:nvPicPr>
+          <p:cNvPr id="82" name="Shape 82"/>
+          <p:cNvPicPr preferRelativeResize="0"/>
+          <p:nvPr/>
+        </p:nvPicPr>
+        <p:blipFill>
+          <a:blip r:embed="rId4">
+            <a:alphaModFix/>
+          </a:blip>
+          <a:stretch>
+            <a:fillRect/>
+          </a:stretch>
+        </p:blipFill>
+        <p:spPr>
+          <a:xfrm>
+            <a:off x="1043150" y="3363300"/>
+            <a:ext cx="2359575" cy="2359575"/>
+          </a:xfrm>
+          <a:prstGeom prst="rect">
+            <a:avLst/>
+          </a:prstGeom>
+          <a:noFill/>
+          <a:ln>
+            <a:noFill/>
+          </a:ln>
+        </p:spPr>
+      </p:pic>
+      <p:pic>
+        <p:nvPicPr>
+          <p:cNvPr id="83" name="Shape 83"/>
+          <p:cNvPicPr preferRelativeResize="0"/>
+          <p:nvPr/>
+        </p:nvPicPr>
+        <p:blipFill>
+          <a:blip r:embed="rId5">
+            <a:alphaModFix/>
+          </a:blip>
+          <a:stretch>
+            <a:fillRect/>
+          </a:stretch>
+        </p:blipFill>
+        <p:spPr>
+          <a:xfrm>
+            <a:off x="5378650" y="3115825"/>
+            <a:ext cx="2109975" cy="2109975"/>
+          </a:xfrm>
+          <a:prstGeom prst="rect">
+            <a:avLst/>
+          </a:prstGeom>
+          <a:noFill/>
+          <a:ln>
+            <a:noFill/>
+          </a:ln>
+        </p:spPr>
+      </p:pic>
+      <p:cxnSp>
+        <p:nvCxnSpPr>
+          <p:cNvPr id="84" name="Shape 84"/>
+          <p:cNvCxnSpPr/>
+          <p:nvPr/>
+        </p:nvCxnSpPr>
+        <p:spPr>
+          <a:xfrm flipV="1">
+            <a:off x="2843808" y="2653975"/>
+            <a:ext cx="677167" cy="709325"/>
+          </a:xfrm>
+          <a:prstGeom prst="straightConnector1">
+            <a:avLst/>
+          </a:prstGeom>
+          <a:noFill/>
+          <a:ln w="38100" cap="flat" cmpd="sng">
+            <a:solidFill>
+              <a:srgbClr val="9FC5E8"/>
+            </a:solidFill>
+            <a:prstDash val="solid"/>
+            <a:round/>
+            <a:headEnd type="none" w="lg" len="lg"/>
+            <a:tailEnd type="none" w="lg" len="lg"/>
+          </a:ln>
+        </p:spPr>
+      </p:cxnSp>
+      <p:cxnSp>
+        <p:nvCxnSpPr>
+          <p:cNvPr id="85" name="Shape 85"/>
+          <p:cNvCxnSpPr/>
+          <p:nvPr/>
+        </p:nvCxnSpPr>
+        <p:spPr>
+          <a:xfrm flipH="1" flipV="1">
+            <a:off x="5197450" y="2530500"/>
+            <a:ext cx="1174750" cy="905346"/>
+          </a:xfrm>
+          <a:prstGeom prst="straightConnector1">
+            <a:avLst/>
+          </a:prstGeom>
+          <a:noFill/>
+          <a:ln w="38100" cap="flat" cmpd="sng">
+            <a:solidFill>
+              <a:srgbClr val="9FC5E8"/>
+            </a:solidFill>
+            <a:prstDash val="solid"/>
+            <a:round/>
+            <a:headEnd type="none" w="lg" len="lg"/>
+            <a:tailEnd type="none" w="lg" len="lg"/>
+          </a:ln>
+        </p:spPr>
+      </p:cxnSp>
+      <p:pic>
+        <p:nvPicPr>
+          <p:cNvPr id="9" name="Shape 56"/>
+          <p:cNvPicPr preferRelativeResize="0"/>
+          <p:nvPr/>
+        </p:nvPicPr>
+        <p:blipFill>
+          <a:blip r:embed="rId6">
+            <a:alphaModFix/>
+          </a:blip>
+          <a:stretch>
+            <a:fillRect/>
+          </a:stretch>
+        </p:blipFill>
+        <p:spPr>
+          <a:xfrm>
+            <a:off x="1527203" y="3723878"/>
+            <a:ext cx="1391467" cy="602037"/>
+          </a:xfrm>
+          <a:prstGeom prst="rect">
+            <a:avLst/>
+          </a:prstGeom>
+          <a:noFill/>
+          <a:ln>
+            <a:noFill/>
+          </a:ln>
+        </p:spPr>
+      </p:pic>
+      <p:pic>
+        <p:nvPicPr>
+          <p:cNvPr id="10" name="Shape 56"/>
+          <p:cNvPicPr preferRelativeResize="0"/>
+          <p:nvPr/>
+        </p:nvPicPr>
+        <p:blipFill>
+          <a:blip r:embed="rId6">
+            <a:alphaModFix/>
+          </a:blip>
+          <a:stretch>
+            <a:fillRect/>
+          </a:stretch>
+        </p:blipFill>
+        <p:spPr>
+          <a:xfrm>
+            <a:off x="6200264" y="3735489"/>
+            <a:ext cx="1060658" cy="458908"/>
+          </a:xfrm>
+          <a:prstGeom prst="rect">
+            <a:avLst/>
+          </a:prstGeom>
+          <a:noFill/>
+          <a:ln>
+            <a:noFill/>
+          </a:ln>
+        </p:spPr>
+      </p:pic>
+    </p:spTree>
+  </p:cSld>
+  <p:clrMapOvr>
+    <a:masterClrMapping/>
+  </p:clrMapOvr>
+  <p:transition spd="slow">
+    <p:cut/>
+  </p:transition>
+  <p:timing>
+    <p:tnLst>
+      <p:par>
+        <p:cTn id="1" dur="indefinite" restart="never" nodeType="tmRoot"/>
+      </p:par>
+    </p:tnLst>
+  </p:timing>
+</p:sld>
+</file>
+
+<file path=ppt/slides/slide5.xml><?xml version="1.0" encoding="utf-8"?>
 <p:sld xmlns:a="http://schemas.openxmlformats.org/drawingml/2006/main" xmlns:r="http://schemas.openxmlformats.org/officeDocument/2006/relationships" xmlns:p="http://schemas.openxmlformats.org/presentationml/2006/main">
   <p:cSld>
     <p:spTree>
@@ -7552,7 +8122,7 @@
 </p:sld>
 </file>
 
-<file path=ppt/slides/slide5.xml><?xml version="1.0" encoding="utf-8"?>
+<file path=ppt/slides/slide6.xml><?xml version="1.0" encoding="utf-8"?>
 <p:sld xmlns:a="http://schemas.openxmlformats.org/drawingml/2006/main" xmlns:r="http://schemas.openxmlformats.org/officeDocument/2006/relationships" xmlns:p="http://schemas.openxmlformats.org/presentationml/2006/main">
   <p:cSld>
     <p:spTree>
@@ -8093,7 +8663,7 @@
 </p:sld>
 </file>
 
-<file path=ppt/slides/slide6.xml><?xml version="1.0" encoding="utf-8"?>
+<file path=ppt/slides/slide7.xml><?xml version="1.0" encoding="utf-8"?>
 <p:sld xmlns:a="http://schemas.openxmlformats.org/drawingml/2006/main" xmlns:r="http://schemas.openxmlformats.org/officeDocument/2006/relationships" xmlns:p="http://schemas.openxmlformats.org/presentationml/2006/main">
   <p:cSld>
     <p:spTree>
@@ -8767,7 +9337,7 @@
 </p:sld>
 </file>
 
-<file path=ppt/slides/slide7.xml><?xml version="1.0" encoding="utf-8"?>
+<file path=ppt/slides/slide8.xml><?xml version="1.0" encoding="utf-8"?>
 <p:sld xmlns:a="http://schemas.openxmlformats.org/drawingml/2006/main" xmlns:r="http://schemas.openxmlformats.org/officeDocument/2006/relationships" xmlns:p="http://schemas.openxmlformats.org/presentationml/2006/main">
   <p:cSld>
     <p:spTree>
@@ -8964,7 +9534,7 @@
 </p:sld>
 </file>
 
-<file path=ppt/slides/slide8.xml><?xml version="1.0" encoding="utf-8"?>
+<file path=ppt/slides/slide9.xml><?xml version="1.0" encoding="utf-8"?>
 <p:sld xmlns:a="http://schemas.openxmlformats.org/drawingml/2006/main" xmlns:r="http://schemas.openxmlformats.org/officeDocument/2006/relationships" xmlns:p="http://schemas.openxmlformats.org/presentationml/2006/main">
   <p:cSld>
     <p:spTree>
@@ -9088,11 +9658,6 @@
               </a:rPr>
               <a:t>Web Application</a:t>
             </a:r>
-            <a:endParaRPr lang="en" dirty="0" smtClean="0">
-              <a:latin typeface="Verdana" panose="020B0604030504040204" pitchFamily="34" charset="0"/>
-              <a:ea typeface="Verdana" panose="020B0604030504040204" pitchFamily="34" charset="0"/>
-              <a:cs typeface="Verdana" panose="020B0604030504040204" pitchFamily="34" charset="0"/>
-            </a:endParaRPr>
           </a:p>
           <a:p>
             <a:pPr lvl="0">
@@ -9398,111 +9963,6 @@
     <p:bldLst>
       <p:bldP spid="113" grpId="0" uiExpand="1" build="p"/>
     </p:bldLst>
-  </p:timing>
-</p:sld>
-</file>
-
-<file path=ppt/slides/slide9.xml><?xml version="1.0" encoding="utf-8"?>
-<p:sld xmlns:a="http://schemas.openxmlformats.org/drawingml/2006/main" xmlns:r="http://schemas.openxmlformats.org/officeDocument/2006/relationships" xmlns:p="http://schemas.openxmlformats.org/presentationml/2006/main">
-  <p:cSld>
-    <p:spTree>
-      <p:nvGrpSpPr>
-        <p:cNvPr id="1" name="Shape 118"/>
-        <p:cNvGrpSpPr/>
-        <p:nvPr/>
-      </p:nvGrpSpPr>
-      <p:grpSpPr>
-        <a:xfrm>
-          <a:off x="0" y="0"/>
-          <a:ext cx="0" cy="0"/>
-          <a:chOff x="0" y="0"/>
-          <a:chExt cx="0" cy="0"/>
-        </a:xfrm>
-      </p:grpSpPr>
-      <p:sp>
-        <p:nvSpPr>
-          <p:cNvPr id="119" name="Shape 119"/>
-          <p:cNvSpPr txBox="1">
-            <a:spLocks noGrp="1"/>
-          </p:cNvSpPr>
-          <p:nvPr>
-            <p:ph type="title"/>
-          </p:nvPr>
-        </p:nvSpPr>
-        <p:spPr>
-          <a:prstGeom prst="rect">
-            <a:avLst/>
-          </a:prstGeom>
-        </p:spPr>
-        <p:txBody>
-          <a:bodyPr lIns="91425" tIns="91425" rIns="91425" bIns="91425" anchor="t" anchorCtr="0">
-            <a:noAutofit/>
-          </a:bodyPr>
-          <a:lstStyle/>
-          <a:p>
-            <a:pPr lvl="0">
-              <a:spcBef>
-                <a:spcPts val="0"/>
-              </a:spcBef>
-              <a:buNone/>
-            </a:pPr>
-            <a:r>
-              <a:rPr lang="en" b="0">
-                <a:latin typeface="Verdana"/>
-                <a:ea typeface="Verdana"/>
-                <a:cs typeface="Verdana"/>
-                <a:sym typeface="Verdana"/>
-              </a:rPr>
-              <a:t>Questions?</a:t>
-            </a:r>
-          </a:p>
-        </p:txBody>
-      </p:sp>
-      <p:sp>
-        <p:nvSpPr>
-          <p:cNvPr id="120" name="Shape 120"/>
-          <p:cNvSpPr txBox="1">
-            <a:spLocks noGrp="1"/>
-          </p:cNvSpPr>
-          <p:nvPr>
-            <p:ph type="body" idx="1"/>
-          </p:nvPr>
-        </p:nvSpPr>
-        <p:spPr>
-          <a:prstGeom prst="rect">
-            <a:avLst/>
-          </a:prstGeom>
-        </p:spPr>
-        <p:txBody>
-          <a:bodyPr lIns="91425" tIns="91425" rIns="91425" bIns="91425" anchor="t" anchorCtr="0">
-            <a:noAutofit/>
-          </a:bodyPr>
-          <a:lstStyle/>
-          <a:p>
-            <a:pPr lvl="0" rtl="0">
-              <a:spcBef>
-                <a:spcPts val="0"/>
-              </a:spcBef>
-              <a:buNone/>
-            </a:pPr>
-            <a:endParaRPr/>
-          </a:p>
-        </p:txBody>
-      </p:sp>
-    </p:spTree>
-  </p:cSld>
-  <p:clrMapOvr>
-    <a:masterClrMapping/>
-  </p:clrMapOvr>
-  <p:transition spd="slow">
-    <p:cut/>
-  </p:transition>
-  <p:timing>
-    <p:tnLst>
-      <p:par>
-        <p:cTn id="1" dur="indefinite" restart="never" nodeType="tmRoot"/>
-      </p:par>
-    </p:tnLst>
   </p:timing>
 </p:sld>
 </file>

</xml_diff>

<commit_message>
Changes to slides and automate typing input
</commit_message>
<xml_diff>
--- a/WURI OP2.pptx
+++ b/WURI OP2.pptx
@@ -801,7 +801,15 @@
             </a:pPr>
             <a:r>
               <a:rPr lang="en-SG" baseline="0" dirty="0" smtClean="0"/>
-              <a:t>For me I often have work due by the midnight of Sunday. If you face a similar situation, no problem! Just type “Do work Sunday 23:59 1w” and WURI will now record this task every week on Sunday. If Sunday has passed and you want to move the deadline to the next weekend, simply type “d 1” to delete last Sunday’s task, bringing forth to the next week. I will leave </a:t>
+              <a:t>For me I often have work due by the midnight of Sunday. If you face a similar situation, no problem! Just type “Do work Sunday 23:59 1w” and WURI will now record this task every week on Sunday. If Sunday has passed and you want to move the deadline to the next weekend, simply type “d 1” to delete last Sunday’s task, </a:t>
+            </a:r>
+            <a:r>
+              <a:rPr lang="en-SG" baseline="0" smtClean="0"/>
+              <a:t>bringing it </a:t>
+            </a:r>
+            <a:r>
+              <a:rPr lang="en-SG" baseline="0" dirty="0" smtClean="0"/>
+              <a:t>forth to the next week. I will leave </a:t>
             </a:r>
             <a:r>
               <a:rPr lang="en-SG" baseline="0" dirty="0" err="1" smtClean="0"/>
@@ -1822,7 +1830,7 @@
             <a:fld id="{7CB97365-EBCA-4027-87D5-99FC1D4DF0BB}" type="datetimeFigureOut">
               <a:rPr lang="en-US" smtClean="0"/>
               <a:pPr eaLnBrk="1" latinLnBrk="0" hangingPunct="1"/>
-              <a:t>4/5/2016</a:t>
+              <a:t>4/6/2016</a:t>
             </a:fld>
             <a:endParaRPr lang="en-US"/>
           </a:p>
@@ -2047,7 +2055,7 @@
             <a:fld id="{7CB97365-EBCA-4027-87D5-99FC1D4DF0BB}" type="datetimeFigureOut">
               <a:rPr lang="en-US" smtClean="0"/>
               <a:pPr eaLnBrk="1" latinLnBrk="0" hangingPunct="1"/>
-              <a:t>4/5/2016</a:t>
+              <a:t>4/6/2016</a:t>
             </a:fld>
             <a:endParaRPr lang="en-US"/>
           </a:p>
@@ -2247,7 +2255,7 @@
             <a:fld id="{7CB97365-EBCA-4027-87D5-99FC1D4DF0BB}" type="datetimeFigureOut">
               <a:rPr lang="en-US" smtClean="0"/>
               <a:pPr eaLnBrk="1" latinLnBrk="0" hangingPunct="1"/>
-              <a:t>4/5/2016</a:t>
+              <a:t>4/6/2016</a:t>
             </a:fld>
             <a:endParaRPr lang="en-US"/>
           </a:p>
@@ -2665,7 +2673,7 @@
             <a:fld id="{7CB97365-EBCA-4027-87D5-99FC1D4DF0BB}" type="datetimeFigureOut">
               <a:rPr lang="en-US" smtClean="0"/>
               <a:pPr eaLnBrk="1" latinLnBrk="0" hangingPunct="1"/>
-              <a:t>4/5/2016</a:t>
+              <a:t>4/6/2016</a:t>
             </a:fld>
             <a:endParaRPr lang="en-US"/>
           </a:p>
@@ -2938,7 +2946,7 @@
             <a:fld id="{7CB97365-EBCA-4027-87D5-99FC1D4DF0BB}" type="datetimeFigureOut">
               <a:rPr lang="en-US" smtClean="0"/>
               <a:pPr eaLnBrk="1" latinLnBrk="0" hangingPunct="1"/>
-              <a:t>4/5/2016</a:t>
+              <a:t>4/6/2016</a:t>
             </a:fld>
             <a:endParaRPr lang="en-US"/>
           </a:p>
@@ -3281,7 +3289,7 @@
             <a:fld id="{7CB97365-EBCA-4027-87D5-99FC1D4DF0BB}" type="datetimeFigureOut">
               <a:rPr lang="en-US" smtClean="0"/>
               <a:pPr eaLnBrk="1" latinLnBrk="0" hangingPunct="1"/>
-              <a:t>4/5/2016</a:t>
+              <a:t>4/6/2016</a:t>
             </a:fld>
             <a:endParaRPr lang="en-US"/>
           </a:p>
@@ -3772,7 +3780,7 @@
             <a:fld id="{7CB97365-EBCA-4027-87D5-99FC1D4DF0BB}" type="datetimeFigureOut">
               <a:rPr lang="en-US" smtClean="0"/>
               <a:pPr eaLnBrk="1" latinLnBrk="0" hangingPunct="1"/>
-              <a:t>4/5/2016</a:t>
+              <a:t>4/6/2016</a:t>
             </a:fld>
             <a:endParaRPr lang="en-US"/>
           </a:p>
@@ -3945,7 +3953,7 @@
             <a:fld id="{7CB97365-EBCA-4027-87D5-99FC1D4DF0BB}" type="datetimeFigureOut">
               <a:rPr lang="en-US" smtClean="0"/>
               <a:pPr eaLnBrk="1" latinLnBrk="0" hangingPunct="1"/>
-              <a:t>4/5/2016</a:t>
+              <a:t>4/6/2016</a:t>
             </a:fld>
             <a:endParaRPr lang="en-US"/>
           </a:p>
@@ -4060,7 +4068,7 @@
             <a:fld id="{7CB97365-EBCA-4027-87D5-99FC1D4DF0BB}" type="datetimeFigureOut">
               <a:rPr lang="en-US" smtClean="0"/>
               <a:pPr eaLnBrk="1" latinLnBrk="0" hangingPunct="1"/>
-              <a:t>4/5/2016</a:t>
+              <a:t>4/6/2016</a:t>
             </a:fld>
             <a:endParaRPr lang="en-US"/>
           </a:p>
@@ -4342,7 +4350,7 @@
             <a:fld id="{7CB97365-EBCA-4027-87D5-99FC1D4DF0BB}" type="datetimeFigureOut">
               <a:rPr lang="en-US" smtClean="0"/>
               <a:pPr eaLnBrk="1" latinLnBrk="0" hangingPunct="1"/>
-              <a:t>4/5/2016</a:t>
+              <a:t>4/6/2016</a:t>
             </a:fld>
             <a:endParaRPr lang="en-US"/>
           </a:p>
@@ -4672,7 +4680,7 @@
             <a:fld id="{7CB97365-EBCA-4027-87D5-99FC1D4DF0BB}" type="datetimeFigureOut">
               <a:rPr lang="en-US" smtClean="0"/>
               <a:pPr eaLnBrk="1" latinLnBrk="0" hangingPunct="1"/>
-              <a:t>4/5/2016</a:t>
+              <a:t>4/6/2016</a:t>
             </a:fld>
             <a:endParaRPr lang="en-US"/>
           </a:p>
@@ -4995,7 +5003,7 @@
             <a:fld id="{7CB97365-EBCA-4027-87D5-99FC1D4DF0BB}" type="datetimeFigureOut">
               <a:rPr lang="en-US" smtClean="0"/>
               <a:pPr eaLnBrk="1" latinLnBrk="0" hangingPunct="1"/>
-              <a:t>4/5/2016</a:t>
+              <a:t>4/6/2016</a:t>
             </a:fld>
             <a:endParaRPr lang="en-US">
               <a:solidFill>

</xml_diff>